<commit_message>
1M here we come
</commit_message>
<xml_diff>
--- a/slides/CloudScale.pptx
+++ b/slides/CloudScale.pptx
@@ -165,6 +165,36 @@
       </a:defRPr>
     </a:lvl9pPr>
   </p:defaultTextStyle>
+  <p:extLst>
+    <p:ext uri="{EFAFB233-063F-42B5-8137-9DF3F51BA10A}">
+      <p15:sldGuideLst xmlns:p15="http://schemas.microsoft.com/office/powerpoint/2012/main">
+        <p15:guide id="1" orient="horz" pos="2160">
+          <p15:clr>
+            <a:srgbClr val="A4A3A4"/>
+          </p15:clr>
+        </p15:guide>
+        <p15:guide id="2" pos="2880">
+          <p15:clr>
+            <a:srgbClr val="A4A3A4"/>
+          </p15:clr>
+        </p15:guide>
+      </p15:sldGuideLst>
+    </p:ext>
+    <p:ext uri="{2D200454-40CA-4A62-9FC3-DE9A4176ACB9}">
+      <p15:notesGuideLst xmlns:p15="http://schemas.microsoft.com/office/powerpoint/2012/main">
+        <p15:guide id="1" orient="horz" pos="2304">
+          <p15:clr>
+            <a:srgbClr val="A4A3A4"/>
+          </p15:clr>
+        </p15:guide>
+        <p15:guide id="2" pos="3024">
+          <p15:clr>
+            <a:srgbClr val="A4A3A4"/>
+          </p15:clr>
+        </p15:guide>
+      </p15:notesGuideLst>
+    </p:ext>
+  </p:extLst>
 </p:presentation>
 </file>
 
@@ -248,7 +278,7 @@
               <a:pPr>
                 <a:defRPr/>
               </a:pPr>
-              <a:t>10/25/2012 3:38 PM</a:t>
+              <a:t>3/16/2013 10:15 AM</a:t>
             </a:fld>
             <a:endParaRPr lang="en-US"/>
           </a:p>
@@ -463,7 +493,7 @@
               <a:pPr>
                 <a:defRPr/>
               </a:pPr>
-              <a:t>10/25/2012 3:38 PM</a:t>
+              <a:t>3/16/2013 10:15 AM</a:t>
             </a:fld>
             <a:endParaRPr lang="en-US"/>
           </a:p>
@@ -868,7 +898,7 @@
             <a:fld id="{645EDAD1-88E4-4536-AD95-0BFD82EC77E6}" type="datetime8">
               <a:rPr lang="en-US" smtClean="0"/>
               <a:pPr/>
-              <a:t>10/25/2012 3:39 PM</a:t>
+              <a:t>3/16/2013 10:15 AM</a:t>
             </a:fld>
             <a:endParaRPr lang="en-US" smtClean="0"/>
           </a:p>
@@ -919,6 +949,11 @@
         </p:spPr>
       </p:sp>
     </p:spTree>
+    <p:extLst>
+      <p:ext uri="{BB962C8B-B14F-4D97-AF65-F5344CB8AC3E}">
+        <p14:creationId xmlns:p14="http://schemas.microsoft.com/office/powerpoint/2010/main" val="1344907076"/>
+      </p:ext>
+    </p:extLst>
   </p:cSld>
   <p:clrMapOvr>
     <a:masterClrMapping/>
@@ -7191,7 +7226,6 @@
               <a:rPr lang="en-US" dirty="0" smtClean="0"/>
               <a:t>How?</a:t>
             </a:r>
-            <a:endParaRPr lang="en-US" dirty="0" smtClean="0"/>
           </a:p>
         </p:txBody>
       </p:sp>
@@ -7330,13 +7364,8 @@
           <a:p>
             <a:r>
               <a:rPr lang="en-US" dirty="0" smtClean="0"/>
-              <a:t>http://</a:t>
-            </a:r>
-            <a:r>
-              <a:rPr lang="en-US" dirty="0" smtClean="0"/>
-              <a:t>github.com/lozanotek/cloudscale</a:t>
-            </a:r>
-            <a:endParaRPr lang="en-US" dirty="0" smtClean="0"/>
+              <a:t>http://github.com/lozanotek/cloudscale</a:t>
+            </a:r>
           </a:p>
         </p:txBody>
       </p:sp>
@@ -7440,7 +7469,7 @@
         <p:spPr>
           <a:xfrm>
             <a:off x="381002" y="1417638"/>
-            <a:ext cx="8410575" cy="2677656"/>
+            <a:ext cx="8410575" cy="3120854"/>
           </a:xfrm>
         </p:spPr>
         <p:txBody>
@@ -7449,8 +7478,17 @@
           <a:p>
             <a:r>
               <a:rPr lang="en-US" dirty="0" smtClean="0"/>
-              <a:t>Increased interest on the conference</a:t>
-            </a:r>
+              <a:t>Increased interest on the </a:t>
+            </a:r>
+            <a:r>
+              <a:rPr lang="en-US" dirty="0" smtClean="0"/>
+              <a:t>conference, </a:t>
+            </a:r>
+            <a:r>
+              <a:rPr lang="en-US" dirty="0" err="1" smtClean="0"/>
+              <a:t>aspConf</a:t>
+            </a:r>
+            <a:endParaRPr lang="en-US" dirty="0" smtClean="0"/>
           </a:p>
           <a:p>
             <a:pPr lvl="1"/>
@@ -7480,7 +7518,11 @@
             <a:pPr lvl="1"/>
             <a:r>
               <a:rPr lang="en-US" dirty="0" smtClean="0"/>
-              <a:t>Year 3 – 8,000 </a:t>
+              <a:t>Year 3 – </a:t>
+            </a:r>
+            <a:r>
+              <a:rPr lang="en-US" dirty="0" smtClean="0"/>
+              <a:t>8,000+ </a:t>
             </a:r>
             <a:r>
               <a:rPr lang="en-US" dirty="0" err="1" smtClean="0"/>
@@ -7631,8 +7673,17 @@
             <a:pPr lvl="1"/>
             <a:r>
               <a:rPr lang="en-US" dirty="0" smtClean="0"/>
-              <a:t>Serving too much content from one source</a:t>
-            </a:r>
+              <a:t>Serving too much content from </a:t>
+            </a:r>
+            <a:r>
+              <a:rPr lang="en-US" smtClean="0"/>
+              <a:t>one </a:t>
+            </a:r>
+            <a:r>
+              <a:rPr lang="en-US" smtClean="0"/>
+              <a:t>source</a:t>
+            </a:r>
+            <a:endParaRPr lang="en-US" dirty="0" smtClean="0"/>
           </a:p>
           <a:p>
             <a:pPr marL="0" indent="0">

</xml_diff>